<commit_message>
small fix in presentation
</commit_message>
<xml_diff>
--- a/PureComponent-vs-memo.pptx
+++ b/PureComponent-vs-memo.pptx
@@ -13712,7 +13712,7 @@
             </a:r>
             <a:r>
               <a:rPr lang="en-US" dirty="0" err="1"/>
-              <a:t>react.memo</a:t>
+              <a:t>React.memo</a:t>
             </a:r>
             <a:r>
               <a:rPr lang="ru-RU" dirty="0"/>
@@ -16577,15 +16577,15 @@
             </a:r>
             <a:r>
               <a:rPr lang="ru-RU" dirty="0"/>
+              <a:t> по</a:t>
+            </a:r>
+            <a:r>
+              <a:rPr lang="en-US" dirty="0"/>
               <a:t> </a:t>
             </a:r>
             <a:r>
-              <a:rPr lang="ru-RU" dirty="0" err="1"/>
-              <a:t>по-умолчанию</a:t>
-            </a:r>
-            <a:r>
-              <a:rPr lang="ru-RU" dirty="0"/>
-              <a:t> стоит свойство </a:t>
+              <a:rPr lang="ru-RU" dirty="0"/>
+              <a:t>умолчанию стоит свойство </a:t>
             </a:r>
             <a:r>
               <a:rPr lang="en-US" dirty="0"/>
@@ -16636,15 +16636,7 @@
             </a:r>
             <a:r>
               <a:rPr lang="ru-RU" dirty="0"/>
-              <a:t> излишне, дважды будут </a:t>
-            </a:r>
-            <a:r>
-              <a:rPr lang="ru-RU" dirty="0" err="1"/>
-              <a:t>проделоваться</a:t>
-            </a:r>
-            <a:r>
-              <a:rPr lang="ru-RU" dirty="0"/>
-              <a:t> одинаковые проверки (</a:t>
+              <a:t> излишне, дважды будут проделываться одинаковые проверки (</a:t>
             </a:r>
             <a:r>
               <a:rPr lang="en-US" dirty="0"/>
@@ -16841,7 +16833,7 @@
             <a:pPr lvl="1"/>
             <a:r>
               <a:rPr lang="ru-RU" dirty="0"/>
-              <a:t>Сравнение абсолютных значений примитивов ( </a:t>
+              <a:t>Сравнение значений примитивов ( </a:t>
             </a:r>
             <a:r>
               <a:rPr lang="en-US" dirty="0"/>
@@ -17749,7 +17741,7 @@
         </p:nvSpPr>
         <p:spPr>
           <a:xfrm>
-            <a:off x="5028227" y="3209461"/>
+            <a:off x="5034577" y="3598229"/>
             <a:ext cx="2490652" cy="1053737"/>
           </a:xfrm>
           <a:prstGeom prst="rect">
@@ -17924,8 +17916,8 @@
         </p:nvCxnSpPr>
         <p:spPr>
           <a:xfrm rot="5400000">
-            <a:off x="5809821" y="4726930"/>
-            <a:ext cx="927464" cy="12700"/>
+            <a:off x="6007380" y="4918139"/>
+            <a:ext cx="538696" cy="6350"/>
           </a:xfrm>
           <a:prstGeom prst="bentConnector3">
             <a:avLst/>
@@ -17966,8 +17958,8 @@
         </p:nvCxnSpPr>
         <p:spPr>
           <a:xfrm rot="5400000">
-            <a:off x="4179142" y="3096251"/>
-            <a:ext cx="927465" cy="3261358"/>
+            <a:off x="4376701" y="3287460"/>
+            <a:ext cx="538697" cy="3267708"/>
           </a:xfrm>
           <a:prstGeom prst="bentConnector3">
             <a:avLst/>
@@ -18073,8 +18065,8 @@
         </p:nvCxnSpPr>
         <p:spPr>
           <a:xfrm rot="16200000" flipH="1">
-            <a:off x="7440500" y="3096250"/>
-            <a:ext cx="927463" cy="3261357"/>
+            <a:off x="7638059" y="3293809"/>
+            <a:ext cx="538695" cy="3255007"/>
           </a:xfrm>
           <a:prstGeom prst="bentConnector3">
             <a:avLst/>
@@ -18112,7 +18104,7 @@
         </p:nvSpPr>
         <p:spPr>
           <a:xfrm>
-            <a:off x="5034577" y="1599162"/>
+            <a:off x="5034577" y="2209503"/>
             <a:ext cx="2490652" cy="1053737"/>
           </a:xfrm>
           <a:prstGeom prst="rect">
@@ -18163,9 +18155,9 @@
           <p:nvPr/>
         </p:nvCxnSpPr>
         <p:spPr>
-          <a:xfrm flipH="1">
-            <a:off x="6273553" y="2652899"/>
-            <a:ext cx="6350" cy="556562"/>
+          <a:xfrm>
+            <a:off x="6279903" y="3263240"/>
+            <a:ext cx="0" cy="334989"/>
           </a:xfrm>
           <a:prstGeom prst="straightConnector1">
             <a:avLst/>
@@ -18205,8 +18197,8 @@
         </p:nvSpPr>
         <p:spPr>
           <a:xfrm>
-            <a:off x="1188130" y="1599162"/>
-            <a:ext cx="3833747" cy="2887451"/>
+            <a:off x="1200830" y="1386355"/>
+            <a:ext cx="10178322" cy="488159"/>
           </a:xfrm>
           <a:prstGeom prst="rect">
             <a:avLst/>

</xml_diff>

<commit_message>
small fixes in presentation
</commit_message>
<xml_diff>
--- a/PureComponent-vs-memo.pptx
+++ b/PureComponent-vs-memo.pptx
@@ -16554,9 +16554,16 @@
             <p:ph idx="1"/>
           </p:nvPr>
         </p:nvSpPr>
-        <p:spPr/>
-        <p:txBody>
-          <a:bodyPr/>
+        <p:spPr>
+          <a:xfrm>
+            <a:off x="1251678" y="2139519"/>
+            <a:ext cx="10178322" cy="4145872"/>
+          </a:xfrm>
+        </p:spPr>
+        <p:txBody>
+          <a:bodyPr>
+            <a:normAutofit/>
+          </a:bodyPr>
           <a:lstStyle/>
           <a:p>
             <a:r>
@@ -16593,7 +16600,15 @@
             </a:r>
             <a:r>
               <a:rPr lang="ru-RU" dirty="0"/>
-              <a:t>, которое поверхностно сравнивает прошлые и текущие значения у </a:t>
+              <a:t>, при наличии которого </a:t>
+            </a:r>
+            <a:r>
+              <a:rPr lang="en-US" dirty="0"/>
+              <a:t>connect</a:t>
+            </a:r>
+            <a:r>
+              <a:rPr lang="ru-RU" dirty="0"/>
+              <a:t> поверхностно сравнивает прошлые и текущие значения у </a:t>
             </a:r>
             <a:r>
               <a:rPr lang="en-US" dirty="0"/>

</xml_diff>